<commit_message>
Considering NSC partitioning uncertainty
Include the NSC partitioning uncertainty into the model simulation for
WTC3 as I did for GPP and respiration components
</commit_message>
<xml_diff>
--- a/raw_data/Figure_1.pptx
+++ b/raw_data/Figure_1.pptx
@@ -214,7 +214,7 @@
           <a:p>
             <a:fld id="{DC23AF62-04DA-F745-A8B9-E35E5BE7FD13}" type="datetimeFigureOut">
               <a:rPr lang="en-US" smtClean="0"/>
-              <a:t>9/20/17</a:t>
+              <a:t>4/20/18</a:t>
             </a:fld>
             <a:endParaRPr lang="en-US"/>
           </a:p>
@@ -379,7 +379,7 @@
           <a:p>
             <a:fld id="{22A196E9-23DA-40C8-8729-A416F64D3FDA}" type="datetimeFigureOut">
               <a:rPr lang="en-AU" smtClean="0"/>
-              <a:t>20/09/2017</a:t>
+              <a:t>20/04/2018</a:t>
             </a:fld>
             <a:endParaRPr lang="en-AU"/>
           </a:p>
@@ -921,7 +921,7 @@
           <a:p>
             <a:fld id="{747BD9CF-C612-43A8-B934-5CF47C06606C}" type="datetimeFigureOut">
               <a:rPr lang="en-AU" smtClean="0"/>
-              <a:t>20/09/2017</a:t>
+              <a:t>20/04/2018</a:t>
             </a:fld>
             <a:endParaRPr lang="en-AU"/>
           </a:p>
@@ -1091,7 +1091,7 @@
           <a:p>
             <a:fld id="{747BD9CF-C612-43A8-B934-5CF47C06606C}" type="datetimeFigureOut">
               <a:rPr lang="en-AU" smtClean="0"/>
-              <a:t>20/09/2017</a:t>
+              <a:t>20/04/2018</a:t>
             </a:fld>
             <a:endParaRPr lang="en-AU"/>
           </a:p>
@@ -1271,7 +1271,7 @@
           <a:p>
             <a:fld id="{747BD9CF-C612-43A8-B934-5CF47C06606C}" type="datetimeFigureOut">
               <a:rPr lang="en-AU" smtClean="0"/>
-              <a:t>20/09/2017</a:t>
+              <a:t>20/04/2018</a:t>
             </a:fld>
             <a:endParaRPr lang="en-AU"/>
           </a:p>
@@ -1441,7 +1441,7 @@
           <a:p>
             <a:fld id="{747BD9CF-C612-43A8-B934-5CF47C06606C}" type="datetimeFigureOut">
               <a:rPr lang="en-AU" smtClean="0"/>
-              <a:t>20/09/2017</a:t>
+              <a:t>20/04/2018</a:t>
             </a:fld>
             <a:endParaRPr lang="en-AU"/>
           </a:p>
@@ -1687,7 +1687,7 @@
           <a:p>
             <a:fld id="{747BD9CF-C612-43A8-B934-5CF47C06606C}" type="datetimeFigureOut">
               <a:rPr lang="en-AU" smtClean="0"/>
-              <a:t>20/09/2017</a:t>
+              <a:t>20/04/2018</a:t>
             </a:fld>
             <a:endParaRPr lang="en-AU"/>
           </a:p>
@@ -1975,7 +1975,7 @@
           <a:p>
             <a:fld id="{747BD9CF-C612-43A8-B934-5CF47C06606C}" type="datetimeFigureOut">
               <a:rPr lang="en-AU" smtClean="0"/>
-              <a:t>20/09/2017</a:t>
+              <a:t>20/04/2018</a:t>
             </a:fld>
             <a:endParaRPr lang="en-AU"/>
           </a:p>
@@ -2397,7 +2397,7 @@
           <a:p>
             <a:fld id="{747BD9CF-C612-43A8-B934-5CF47C06606C}" type="datetimeFigureOut">
               <a:rPr lang="en-AU" smtClean="0"/>
-              <a:t>20/09/2017</a:t>
+              <a:t>20/04/2018</a:t>
             </a:fld>
             <a:endParaRPr lang="en-AU"/>
           </a:p>
@@ -2515,7 +2515,7 @@
           <a:p>
             <a:fld id="{747BD9CF-C612-43A8-B934-5CF47C06606C}" type="datetimeFigureOut">
               <a:rPr lang="en-AU" smtClean="0"/>
-              <a:t>20/09/2017</a:t>
+              <a:t>20/04/2018</a:t>
             </a:fld>
             <a:endParaRPr lang="en-AU"/>
           </a:p>
@@ -2610,7 +2610,7 @@
           <a:p>
             <a:fld id="{747BD9CF-C612-43A8-B934-5CF47C06606C}" type="datetimeFigureOut">
               <a:rPr lang="en-AU" smtClean="0"/>
-              <a:t>20/09/2017</a:t>
+              <a:t>20/04/2018</a:t>
             </a:fld>
             <a:endParaRPr lang="en-AU"/>
           </a:p>
@@ -2887,7 +2887,7 @@
           <a:p>
             <a:fld id="{747BD9CF-C612-43A8-B934-5CF47C06606C}" type="datetimeFigureOut">
               <a:rPr lang="en-AU" smtClean="0"/>
-              <a:t>20/09/2017</a:t>
+              <a:t>20/04/2018</a:t>
             </a:fld>
             <a:endParaRPr lang="en-AU"/>
           </a:p>
@@ -3140,7 +3140,7 @@
           <a:p>
             <a:fld id="{747BD9CF-C612-43A8-B934-5CF47C06606C}" type="datetimeFigureOut">
               <a:rPr lang="en-AU" smtClean="0"/>
-              <a:t>20/09/2017</a:t>
+              <a:t>20/04/2018</a:t>
             </a:fld>
             <a:endParaRPr lang="en-AU"/>
           </a:p>
@@ -3353,7 +3353,7 @@
           <a:p>
             <a:fld id="{747BD9CF-C612-43A8-B934-5CF47C06606C}" type="datetimeFigureOut">
               <a:rPr lang="en-AU" smtClean="0"/>
-              <a:t>20/09/2017</a:t>
+              <a:t>20/04/2018</a:t>
             </a:fld>
             <a:endParaRPr lang="en-AU"/>
           </a:p>
@@ -3736,10 +3736,10 @@
         </p:nvGrpSpPr>
         <p:grpSpPr>
           <a:xfrm>
-            <a:off x="2107712" y="1962572"/>
-            <a:ext cx="3523297" cy="1440160"/>
-            <a:chOff x="2107712" y="1312907"/>
-            <a:chExt cx="3523296" cy="2021396"/>
+            <a:off x="2395744" y="1884211"/>
+            <a:ext cx="3235265" cy="1518521"/>
+            <a:chOff x="2395744" y="1202919"/>
+            <a:chExt cx="3235264" cy="2131383"/>
           </a:xfrm>
         </p:grpSpPr>
         <p:grpSp>
@@ -3750,10 +3750,10 @@
           </p:nvGrpSpPr>
           <p:grpSpPr>
             <a:xfrm>
-              <a:off x="2107712" y="1312907"/>
-              <a:ext cx="3516019" cy="2021396"/>
-              <a:chOff x="2107712" y="1312907"/>
-              <a:chExt cx="3516019" cy="2021396"/>
+              <a:off x="2395744" y="1202919"/>
+              <a:ext cx="3227989" cy="2131383"/>
+              <a:chOff x="2395744" y="1202919"/>
+              <a:chExt cx="3227989" cy="2131383"/>
             </a:xfrm>
           </p:grpSpPr>
           <p:grpSp>
@@ -3766,10 +3766,10 @@
             </p:nvGrpSpPr>
             <p:grpSpPr>
               <a:xfrm>
-                <a:off x="2304869" y="1312907"/>
-                <a:ext cx="3318862" cy="2021396"/>
-                <a:chOff x="4970605" y="778358"/>
-                <a:chExt cx="3318851" cy="2021396"/>
+                <a:off x="2718049" y="1202919"/>
+                <a:ext cx="2905684" cy="2131383"/>
+                <a:chOff x="5383783" y="668370"/>
+                <a:chExt cx="2905674" cy="2131383"/>
               </a:xfrm>
               <a:effectLst/>
             </p:grpSpPr>
@@ -3781,10 +3781,10 @@
               </p:nvGrpSpPr>
               <p:grpSpPr>
                 <a:xfrm>
-                  <a:off x="4970605" y="778358"/>
-                  <a:ext cx="3318851" cy="2021396"/>
-                  <a:chOff x="4970605" y="778358"/>
-                  <a:chExt cx="3318851" cy="2021396"/>
+                  <a:off x="5383783" y="668370"/>
+                  <a:ext cx="2905674" cy="2131383"/>
+                  <a:chOff x="5383783" y="668370"/>
+                  <a:chExt cx="2905674" cy="2131383"/>
                 </a:xfrm>
               </p:grpSpPr>
               <p:grpSp>
@@ -3795,10 +3795,10 @@
                 </p:nvGrpSpPr>
                 <p:grpSpPr>
                   <a:xfrm>
-                    <a:off x="4970605" y="778358"/>
-                    <a:ext cx="3318851" cy="2021396"/>
-                    <a:chOff x="4741422" y="1012547"/>
-                    <a:chExt cx="4468258" cy="2609593"/>
+                    <a:off x="5383783" y="668370"/>
+                    <a:ext cx="2905674" cy="2131383"/>
+                    <a:chOff x="5297694" y="870555"/>
+                    <a:chExt cx="3911986" cy="2751585"/>
                   </a:xfrm>
                 </p:grpSpPr>
                 <p:grpSp>
@@ -3809,10 +3809,10 @@
                   </p:nvGrpSpPr>
                   <p:grpSpPr>
                     <a:xfrm>
-                      <a:off x="4909907" y="1588024"/>
-                      <a:ext cx="1824760" cy="507978"/>
-                      <a:chOff x="3466646" y="3723878"/>
-                      <a:chExt cx="2307786" cy="557922"/>
+                      <a:off x="5297694" y="1588024"/>
+                      <a:ext cx="1436974" cy="507978"/>
+                      <a:chOff x="3957082" y="3723878"/>
+                      <a:chExt cx="1817350" cy="557922"/>
                     </a:xfrm>
                   </p:grpSpPr>
                   <p:sp>
@@ -3884,8 +3884,8 @@
                     </p:nvCxnSpPr>
                     <p:spPr>
                       <a:xfrm>
-                        <a:off x="3466646" y="4037062"/>
-                        <a:ext cx="992112" cy="0"/>
+                        <a:off x="3957082" y="4037061"/>
+                        <a:ext cx="501677" cy="2"/>
                       </a:xfrm>
                       <a:prstGeom prst="straightConnector1">
                         <a:avLst/>
@@ -4032,10 +4032,10 @@
                   </p:nvGrpSpPr>
                   <p:grpSpPr>
                     <a:xfrm>
-                      <a:off x="4741422" y="1042825"/>
-                      <a:ext cx="750159" cy="830570"/>
-                      <a:chOff x="715700" y="1540902"/>
-                      <a:chExt cx="948732" cy="912231"/>
+                      <a:off x="5519332" y="870555"/>
+                      <a:ext cx="750160" cy="830570"/>
+                      <a:chOff x="1699529" y="1351695"/>
+                      <a:chExt cx="948733" cy="912231"/>
                     </a:xfrm>
                   </p:grpSpPr>
                   <p:cxnSp>
@@ -4046,8 +4046,8 @@
                     </p:nvCxnSpPr>
                     <p:spPr>
                       <a:xfrm flipV="1">
-                        <a:off x="1411225" y="1687459"/>
-                        <a:ext cx="10851" cy="765674"/>
+                        <a:off x="2395054" y="1498251"/>
+                        <a:ext cx="10851" cy="765675"/>
                       </a:xfrm>
                       <a:prstGeom prst="straightConnector1">
                         <a:avLst/>
@@ -4082,8 +4082,8 @@
                     </p:nvSpPr>
                     <p:spPr>
                       <a:xfrm>
-                        <a:off x="715700" y="1540902"/>
-                        <a:ext cx="743956" cy="338336"/>
+                        <a:off x="1699529" y="1351695"/>
+                        <a:ext cx="743956" cy="338335"/>
                       </a:xfrm>
                       <a:prstGeom prst="rect">
                         <a:avLst/>
@@ -4144,8 +4144,8 @@
                     </p:nvSpPr>
                     <p:spPr>
                       <a:xfrm rot="5400000">
-                        <a:off x="1363824" y="1924007"/>
-                        <a:ext cx="97160" cy="504056"/>
+                        <a:off x="2347654" y="1734799"/>
+                        <a:ext cx="97160" cy="504057"/>
                       </a:xfrm>
                       <a:prstGeom prst="flowChartCollate">
                         <a:avLst/>
@@ -5480,7 +5480,7 @@
             </p:nvSpPr>
             <p:spPr>
               <a:xfrm>
-                <a:off x="2107712" y="1860242"/>
+                <a:off x="2395744" y="1860242"/>
                 <a:ext cx="394312" cy="238615"/>
               </a:xfrm>
               <a:prstGeom prst="rect">
@@ -5511,7 +5511,7 @@
               <a:p>
                 <a:pPr algn="ctr"/>
                 <a:r>
-                  <a:rPr lang="en-US" sz="800" smtClean="0">
+                  <a:rPr lang="en-US" sz="800" dirty="0" smtClean="0">
                     <a:solidFill>
                       <a:schemeClr val="tx1"/>
                     </a:solidFill>

</xml_diff>